<commit_message>
Added Figure 9, updated figure 8
</commit_message>
<xml_diff>
--- a/figure8.pptx
+++ b/figure8.pptx
@@ -3372,14 +3372,14 @@
               <a:r>
                 <a:rPr lang="en-US" sz="4400" dirty="0">
                   <a:solidFill>
-                    <a:sysClr val="windowText" lastClr="000000"/>
+                    <a:schemeClr val="bg1"/>
                   </a:solidFill>
                 </a:rPr>
                 <a:t>7</a:t>
               </a:r>
               <a:endParaRPr lang="en-US" dirty="0">
                 <a:solidFill>
-                  <a:sysClr val="windowText" lastClr="000000"/>
+                  <a:schemeClr val="bg1"/>
                 </a:solidFill>
               </a:endParaRPr>
             </a:p>
@@ -3486,14 +3486,14 @@
               <a:r>
                 <a:rPr lang="en-US" sz="4400" dirty="0">
                   <a:solidFill>
-                    <a:sysClr val="windowText" lastClr="000000"/>
+                    <a:schemeClr val="bg1"/>
                   </a:solidFill>
                 </a:rPr>
                 <a:t>7</a:t>
               </a:r>
               <a:endParaRPr lang="en-US" dirty="0">
                 <a:solidFill>
-                  <a:sysClr val="windowText" lastClr="000000"/>
+                  <a:schemeClr val="bg1"/>
                 </a:solidFill>
               </a:endParaRPr>
             </a:p>
@@ -3643,14 +3643,14 @@
                 <a:r>
                   <a:rPr lang="en-US" sz="4400" dirty="0">
                     <a:solidFill>
-                      <a:sysClr val="windowText" lastClr="000000"/>
+                      <a:schemeClr val="bg1"/>
                     </a:solidFill>
                   </a:rPr>
                   <a:t>7</a:t>
                 </a:r>
                 <a:endParaRPr lang="en-US" dirty="0">
                   <a:solidFill>
-                    <a:sysClr val="windowText" lastClr="000000"/>
+                    <a:schemeClr val="bg1"/>
                   </a:solidFill>
                 </a:endParaRPr>
               </a:p>
@@ -4069,16 +4069,16 @@
               <a:p>
                 <a:pPr algn="ctr"/>
                 <a:r>
-                  <a:rPr lang="en-US" sz="4400" dirty="0">
+                  <a:rPr lang="en-US" sz="4400" dirty="0" smtClean="0">
                     <a:solidFill>
-                      <a:sysClr val="windowText" lastClr="000000"/>
+                      <a:schemeClr val="bg1"/>
                     </a:solidFill>
                   </a:rPr>
                   <a:t>7</a:t>
                 </a:r>
                 <a:endParaRPr lang="en-US" dirty="0">
                   <a:solidFill>
-                    <a:sysClr val="windowText" lastClr="000000"/>
+                    <a:schemeClr val="bg1"/>
                   </a:solidFill>
                 </a:endParaRPr>
               </a:p>

</xml_diff>

<commit_message>
Added the ppt for dataset1-extended
</commit_message>
<xml_diff>
--- a/figure8.pptx
+++ b/figure8.pptx
@@ -6,7 +6,6 @@
   </p:sldMasterIdLst>
   <p:sldIdLst>
     <p:sldId id="256" r:id="rId2"/>
-    <p:sldId id="257" r:id="rId3"/>
   </p:sldIdLst>
   <p:sldSz cx="17281525" cy="12436475"/>
   <p:notesSz cx="6858000" cy="9144000"/>
@@ -4531,1020 +4530,6 @@
 </p:sld>
 </file>
 
-<file path=ppt/slides/slide2.xml><?xml version="1.0" encoding="utf-8"?>
-<p:sld xmlns:a="http://schemas.openxmlformats.org/drawingml/2006/main" xmlns:r="http://schemas.openxmlformats.org/officeDocument/2006/relationships" xmlns:p="http://schemas.openxmlformats.org/presentationml/2006/main">
-  <p:cSld>
-    <p:spTree>
-      <p:nvGrpSpPr>
-        <p:cNvPr id="1" name=""/>
-        <p:cNvGrpSpPr/>
-        <p:nvPr/>
-      </p:nvGrpSpPr>
-      <p:grpSpPr>
-        <a:xfrm>
-          <a:off x="0" y="0"/>
-          <a:ext cx="0" cy="0"/>
-          <a:chOff x="0" y="0"/>
-          <a:chExt cx="0" cy="0"/>
-        </a:xfrm>
-      </p:grpSpPr>
-      <p:pic>
-        <p:nvPicPr>
-          <p:cNvPr id="5" name="Picture 4"/>
-          <p:cNvPicPr>
-            <a:picLocks noChangeAspect="1"/>
-          </p:cNvPicPr>
-          <p:nvPr/>
-        </p:nvPicPr>
-        <p:blipFill>
-          <a:blip r:embed="rId2">
-            <a:extLst>
-              <a:ext uri="{28A0092B-C50C-407E-A947-70E740481C1C}">
-                <a14:useLocalDpi xmlns:a14="http://schemas.microsoft.com/office/drawing/2010/main" val="0"/>
-              </a:ext>
-            </a:extLst>
-          </a:blip>
-          <a:stretch>
-            <a:fillRect/>
-          </a:stretch>
-        </p:blipFill>
-        <p:spPr>
-          <a:xfrm>
-            <a:off x="9707562" y="1408988"/>
-            <a:ext cx="6280041" cy="5274651"/>
-          </a:xfrm>
-          <a:prstGeom prst="rect">
-            <a:avLst/>
-          </a:prstGeom>
-        </p:spPr>
-      </p:pic>
-      <p:pic>
-        <p:nvPicPr>
-          <p:cNvPr id="16" name="Picture 15"/>
-          <p:cNvPicPr>
-            <a:picLocks noChangeAspect="1"/>
-          </p:cNvPicPr>
-          <p:nvPr/>
-        </p:nvPicPr>
-        <p:blipFill rotWithShape="1">
-          <a:blip r:embed="rId3">
-            <a:extLst>
-              <a:ext uri="{28A0092B-C50C-407E-A947-70E740481C1C}">
-                <a14:useLocalDpi xmlns:a14="http://schemas.microsoft.com/office/drawing/2010/main" val="0"/>
-              </a:ext>
-            </a:extLst>
-          </a:blip>
-          <a:srcRect t="22207" b="8412"/>
-          <a:stretch/>
-        </p:blipFill>
-        <p:spPr>
-          <a:xfrm>
-            <a:off x="10295486" y="7056439"/>
-            <a:ext cx="6458754" cy="4495799"/>
-          </a:xfrm>
-          <a:prstGeom prst="rect">
-            <a:avLst/>
-          </a:prstGeom>
-        </p:spPr>
-      </p:pic>
-      <p:pic>
-        <p:nvPicPr>
-          <p:cNvPr id="17" name="Picture 16"/>
-          <p:cNvPicPr>
-            <a:picLocks noChangeAspect="1"/>
-          </p:cNvPicPr>
-          <p:nvPr/>
-        </p:nvPicPr>
-        <p:blipFill rotWithShape="1">
-          <a:blip r:embed="rId4">
-            <a:extLst>
-              <a:ext uri="{28A0092B-C50C-407E-A947-70E740481C1C}">
-                <a14:useLocalDpi xmlns:a14="http://schemas.microsoft.com/office/drawing/2010/main" val="0"/>
-              </a:ext>
-            </a:extLst>
-          </a:blip>
-          <a:srcRect t="31785" b="6890"/>
-          <a:stretch/>
-        </p:blipFill>
-        <p:spPr>
-          <a:xfrm>
-            <a:off x="2560126" y="7056438"/>
-            <a:ext cx="6948054" cy="4495800"/>
-          </a:xfrm>
-          <a:prstGeom prst="rect">
-            <a:avLst/>
-          </a:prstGeom>
-        </p:spPr>
-      </p:pic>
-      <p:sp>
-        <p:nvSpPr>
-          <p:cNvPr id="18" name="Flowchart: Alternate Process 17"/>
-          <p:cNvSpPr/>
-          <p:nvPr/>
-        </p:nvSpPr>
-        <p:spPr>
-          <a:xfrm>
-            <a:off x="9318206" y="413294"/>
-            <a:ext cx="7855484" cy="822960"/>
-          </a:xfrm>
-          <a:prstGeom prst="flowChartAlternateProcess">
-            <a:avLst/>
-          </a:prstGeom>
-          <a:solidFill>
-            <a:srgbClr val="E7E6E6"/>
-          </a:solidFill>
-          <a:ln>
-            <a:noFill/>
-          </a:ln>
-        </p:spPr>
-        <p:style>
-          <a:lnRef idx="2">
-            <a:schemeClr val="accent1">
-              <a:shade val="50000"/>
-            </a:schemeClr>
-          </a:lnRef>
-          <a:fillRef idx="1">
-            <a:schemeClr val="accent1"/>
-          </a:fillRef>
-          <a:effectRef idx="0">
-            <a:schemeClr val="accent1"/>
-          </a:effectRef>
-          <a:fontRef idx="minor">
-            <a:schemeClr val="lt1"/>
-          </a:fontRef>
-        </p:style>
-        <p:txBody>
-          <a:bodyPr rtlCol="0" anchor="ctr"/>
-          <a:lstStyle/>
-          <a:p>
-            <a:pPr algn="ctr"/>
-            <a:r>
-              <a:rPr lang="en-US" sz="4400" dirty="0" smtClean="0">
-                <a:solidFill>
-                  <a:srgbClr val="238B45"/>
-                </a:solidFill>
-              </a:rPr>
-              <a:t>Fiber Bundles Volume</a:t>
-            </a:r>
-            <a:endParaRPr lang="en-US" sz="4400" dirty="0">
-              <a:solidFill>
-                <a:srgbClr val="238B45"/>
-              </a:solidFill>
-            </a:endParaRPr>
-          </a:p>
-        </p:txBody>
-      </p:sp>
-      <p:sp>
-        <p:nvSpPr>
-          <p:cNvPr id="19" name="Teardrop 18"/>
-          <p:cNvSpPr>
-            <a:spLocks noChangeAspect="1"/>
-          </p:cNvSpPr>
-          <p:nvPr/>
-        </p:nvSpPr>
-        <p:spPr>
-          <a:xfrm rot="5400000">
-            <a:off x="8753095" y="99322"/>
-            <a:ext cx="1114016" cy="1159847"/>
-          </a:xfrm>
-          <a:prstGeom prst="teardrop">
-            <a:avLst/>
-          </a:prstGeom>
-          <a:solidFill>
-            <a:srgbClr val="238B45"/>
-          </a:solidFill>
-          <a:ln>
-            <a:solidFill>
-              <a:schemeClr val="accent1">
-                <a:shade val="50000"/>
-                <a:alpha val="19000"/>
-              </a:schemeClr>
-            </a:solidFill>
-          </a:ln>
-        </p:spPr>
-        <p:style>
-          <a:lnRef idx="2">
-            <a:schemeClr val="accent1">
-              <a:shade val="50000"/>
-            </a:schemeClr>
-          </a:lnRef>
-          <a:fillRef idx="1">
-            <a:schemeClr val="accent1"/>
-          </a:fillRef>
-          <a:effectRef idx="0">
-            <a:schemeClr val="accent1"/>
-          </a:effectRef>
-          <a:fontRef idx="minor">
-            <a:schemeClr val="lt1"/>
-          </a:fontRef>
-        </p:style>
-        <p:txBody>
-          <a:bodyPr vert="vert270" rtlCol="0" anchor="ctr"/>
-          <a:lstStyle/>
-          <a:p>
-            <a:pPr algn="ctr"/>
-            <a:r>
-              <a:rPr lang="en-US" sz="8800" dirty="0"/>
-              <a:t>B</a:t>
-            </a:r>
-          </a:p>
-        </p:txBody>
-      </p:sp>
-      <p:sp>
-        <p:nvSpPr>
-          <p:cNvPr id="20" name="Flowchart: Alternate Process 19"/>
-          <p:cNvSpPr/>
-          <p:nvPr/>
-        </p:nvSpPr>
-        <p:spPr>
-          <a:xfrm>
-            <a:off x="620444" y="413294"/>
-            <a:ext cx="8021905" cy="822960"/>
-          </a:xfrm>
-          <a:prstGeom prst="flowChartAlternateProcess">
-            <a:avLst/>
-          </a:prstGeom>
-          <a:solidFill>
-            <a:srgbClr val="E7E6E6"/>
-          </a:solidFill>
-          <a:ln>
-            <a:noFill/>
-          </a:ln>
-        </p:spPr>
-        <p:style>
-          <a:lnRef idx="2">
-            <a:schemeClr val="accent1">
-              <a:shade val="50000"/>
-            </a:schemeClr>
-          </a:lnRef>
-          <a:fillRef idx="1">
-            <a:schemeClr val="accent1"/>
-          </a:fillRef>
-          <a:effectRef idx="0">
-            <a:schemeClr val="accent1"/>
-          </a:effectRef>
-          <a:fontRef idx="minor">
-            <a:schemeClr val="lt1"/>
-          </a:fontRef>
-        </p:style>
-        <p:txBody>
-          <a:bodyPr rtlCol="0" anchor="ctr"/>
-          <a:lstStyle/>
-          <a:p>
-            <a:pPr algn="ctr"/>
-            <a:r>
-              <a:rPr lang="en-US" sz="4400" dirty="0" smtClean="0">
-                <a:solidFill>
-                  <a:srgbClr val="238B45"/>
-                </a:solidFill>
-              </a:rPr>
-              <a:t>MetaTracts</a:t>
-            </a:r>
-            <a:endParaRPr lang="en-US" sz="4400" dirty="0"/>
-          </a:p>
-        </p:txBody>
-      </p:sp>
-      <p:sp>
-        <p:nvSpPr>
-          <p:cNvPr id="21" name="Teardrop 20"/>
-          <p:cNvSpPr>
-            <a:spLocks noChangeAspect="1"/>
-          </p:cNvSpPr>
-          <p:nvPr/>
-        </p:nvSpPr>
-        <p:spPr>
-          <a:xfrm rot="5400000">
-            <a:off x="43666" y="99322"/>
-            <a:ext cx="1114016" cy="1159847"/>
-          </a:xfrm>
-          <a:prstGeom prst="teardrop">
-            <a:avLst/>
-          </a:prstGeom>
-          <a:solidFill>
-            <a:srgbClr val="238B45"/>
-          </a:solidFill>
-          <a:ln>
-            <a:solidFill>
-              <a:schemeClr val="accent1">
-                <a:shade val="50000"/>
-                <a:alpha val="19000"/>
-              </a:schemeClr>
-            </a:solidFill>
-          </a:ln>
-        </p:spPr>
-        <p:style>
-          <a:lnRef idx="2">
-            <a:schemeClr val="accent1">
-              <a:shade val="50000"/>
-            </a:schemeClr>
-          </a:lnRef>
-          <a:fillRef idx="1">
-            <a:schemeClr val="accent1"/>
-          </a:fillRef>
-          <a:effectRef idx="0">
-            <a:schemeClr val="accent1"/>
-          </a:effectRef>
-          <a:fontRef idx="minor">
-            <a:schemeClr val="lt1"/>
-          </a:fontRef>
-        </p:style>
-        <p:txBody>
-          <a:bodyPr vert="vert270" rtlCol="0" anchor="ctr"/>
-          <a:lstStyle/>
-          <a:p>
-            <a:pPr algn="ctr"/>
-            <a:r>
-              <a:rPr lang="en-US" sz="8800" dirty="0"/>
-              <a:t>A</a:t>
-            </a:r>
-          </a:p>
-        </p:txBody>
-      </p:sp>
-      <p:pic>
-        <p:nvPicPr>
-          <p:cNvPr id="22" name="Picture 21"/>
-          <p:cNvPicPr>
-            <a:picLocks noChangeAspect="1"/>
-          </p:cNvPicPr>
-          <p:nvPr/>
-        </p:nvPicPr>
-        <p:blipFill rotWithShape="1">
-          <a:blip r:embed="rId5">
-            <a:extLst>
-              <a:ext uri="{28A0092B-C50C-407E-A947-70E740481C1C}">
-                <a14:useLocalDpi xmlns:a14="http://schemas.microsoft.com/office/drawing/2010/main" val="0"/>
-              </a:ext>
-            </a:extLst>
-          </a:blip>
-          <a:srcRect l="2951" t="5321" r="5416" b="1841"/>
-          <a:stretch/>
-        </p:blipFill>
-        <p:spPr>
-          <a:xfrm>
-            <a:off x="2290303" y="1555649"/>
-            <a:ext cx="6147719" cy="4719765"/>
-          </a:xfrm>
-          <a:prstGeom prst="rect">
-            <a:avLst/>
-          </a:prstGeom>
-        </p:spPr>
-      </p:pic>
-      <p:grpSp>
-        <p:nvGrpSpPr>
-          <p:cNvPr id="23" name="Group 22"/>
-          <p:cNvGrpSpPr>
-            <a:grpSpLocks noChangeAspect="1"/>
-          </p:cNvGrpSpPr>
-          <p:nvPr/>
-        </p:nvGrpSpPr>
-        <p:grpSpPr>
-          <a:xfrm>
-            <a:off x="11155362" y="1408988"/>
-            <a:ext cx="1142051" cy="2396833"/>
-            <a:chOff x="7085974" y="457200"/>
-            <a:chExt cx="502973" cy="1055596"/>
-          </a:xfrm>
-        </p:grpSpPr>
-        <p:sp>
-          <p:nvSpPr>
-            <p:cNvPr id="24" name="Oval 23"/>
-            <p:cNvSpPr>
-              <a:spLocks/>
-            </p:cNvSpPr>
-            <p:nvPr/>
-          </p:nvSpPr>
-          <p:spPr>
-            <a:xfrm>
-              <a:off x="7085974" y="457200"/>
-              <a:ext cx="502973" cy="502974"/>
-            </a:xfrm>
-            <a:prstGeom prst="ellipse">
-              <a:avLst/>
-            </a:prstGeom>
-            <a:solidFill>
-              <a:srgbClr val="0DE3E3"/>
-            </a:solidFill>
-            <a:ln w="60325">
-              <a:solidFill>
-                <a:srgbClr val="05314B"/>
-              </a:solidFill>
-            </a:ln>
-          </p:spPr>
-          <p:style>
-            <a:lnRef idx="2">
-              <a:schemeClr val="accent1">
-                <a:shade val="50000"/>
-              </a:schemeClr>
-            </a:lnRef>
-            <a:fillRef idx="1">
-              <a:schemeClr val="accent1"/>
-            </a:fillRef>
-            <a:effectRef idx="0">
-              <a:schemeClr val="accent1"/>
-            </a:effectRef>
-            <a:fontRef idx="minor">
-              <a:schemeClr val="lt1"/>
-            </a:fontRef>
-          </p:style>
-          <p:txBody>
-            <a:bodyPr rtlCol="0" anchor="ctr"/>
-            <a:lstStyle/>
-            <a:p>
-              <a:pPr algn="ctr"/>
-              <a:r>
-                <a:rPr lang="en-US" sz="6600" dirty="0">
-                  <a:ln w="0"/>
-                  <a:solidFill>
-                    <a:schemeClr val="tx1"/>
-                  </a:solidFill>
-                  <a:effectLst>
-                    <a:outerShdw blurRad="38100" dist="19050" dir="2700000" algn="tl" rotWithShape="0">
-                      <a:schemeClr val="dk1">
-                        <a:alpha val="40000"/>
-                      </a:schemeClr>
-                    </a:outerShdw>
-                  </a:effectLst>
-                </a:rPr>
-                <a:t>1</a:t>
-              </a:r>
-              <a:endParaRPr lang="en-US" sz="1600" dirty="0">
-                <a:ln w="0"/>
-                <a:solidFill>
-                  <a:schemeClr val="tx1"/>
-                </a:solidFill>
-                <a:effectLst>
-                  <a:outerShdw blurRad="38100" dist="19050" dir="2700000" algn="tl" rotWithShape="0">
-                    <a:schemeClr val="dk1">
-                      <a:alpha val="40000"/>
-                    </a:schemeClr>
-                  </a:outerShdw>
-                </a:effectLst>
-              </a:endParaRPr>
-            </a:p>
-          </p:txBody>
-        </p:sp>
-        <p:cxnSp>
-          <p:nvCxnSpPr>
-            <p:cNvPr id="25" name="Straight Connector 24"/>
-            <p:cNvCxnSpPr>
-              <a:stCxn id="24" idx="4"/>
-            </p:cNvCxnSpPr>
-            <p:nvPr/>
-          </p:nvCxnSpPr>
-          <p:spPr>
-            <a:xfrm>
-              <a:off x="7337461" y="960174"/>
-              <a:ext cx="9253" cy="552622"/>
-            </a:xfrm>
-            <a:prstGeom prst="line">
-              <a:avLst/>
-            </a:prstGeom>
-            <a:ln w="60325">
-              <a:solidFill>
-                <a:srgbClr val="05314B"/>
-              </a:solidFill>
-            </a:ln>
-          </p:spPr>
-          <p:style>
-            <a:lnRef idx="1">
-              <a:schemeClr val="accent1"/>
-            </a:lnRef>
-            <a:fillRef idx="0">
-              <a:schemeClr val="accent1"/>
-            </a:fillRef>
-            <a:effectRef idx="0">
-              <a:schemeClr val="accent1"/>
-            </a:effectRef>
-            <a:fontRef idx="minor">
-              <a:schemeClr val="tx1"/>
-            </a:fontRef>
-          </p:style>
-        </p:cxnSp>
-      </p:grpSp>
-      <p:grpSp>
-        <p:nvGrpSpPr>
-          <p:cNvPr id="26" name="Group 25"/>
-          <p:cNvGrpSpPr>
-            <a:grpSpLocks noChangeAspect="1"/>
-          </p:cNvGrpSpPr>
-          <p:nvPr/>
-        </p:nvGrpSpPr>
-        <p:grpSpPr>
-          <a:xfrm>
-            <a:off x="3306762" y="6683639"/>
-            <a:ext cx="1142051" cy="2396833"/>
-            <a:chOff x="7085974" y="457200"/>
-            <a:chExt cx="502973" cy="1055596"/>
-          </a:xfrm>
-        </p:grpSpPr>
-        <p:sp>
-          <p:nvSpPr>
-            <p:cNvPr id="27" name="Oval 26"/>
-            <p:cNvSpPr>
-              <a:spLocks/>
-            </p:cNvSpPr>
-            <p:nvPr/>
-          </p:nvSpPr>
-          <p:spPr>
-            <a:xfrm>
-              <a:off x="7085974" y="457200"/>
-              <a:ext cx="502973" cy="502974"/>
-            </a:xfrm>
-            <a:prstGeom prst="ellipse">
-              <a:avLst/>
-            </a:prstGeom>
-            <a:solidFill>
-              <a:srgbClr val="0C5EF7"/>
-            </a:solidFill>
-            <a:ln w="60325">
-              <a:solidFill>
-                <a:srgbClr val="05314B"/>
-              </a:solidFill>
-            </a:ln>
-          </p:spPr>
-          <p:style>
-            <a:lnRef idx="2">
-              <a:schemeClr val="accent1">
-                <a:shade val="50000"/>
-              </a:schemeClr>
-            </a:lnRef>
-            <a:fillRef idx="1">
-              <a:schemeClr val="accent1"/>
-            </a:fillRef>
-            <a:effectRef idx="0">
-              <a:schemeClr val="accent1"/>
-            </a:effectRef>
-            <a:fontRef idx="minor">
-              <a:schemeClr val="lt1"/>
-            </a:fontRef>
-          </p:style>
-          <p:txBody>
-            <a:bodyPr rtlCol="0" anchor="ctr"/>
-            <a:lstStyle/>
-            <a:p>
-              <a:pPr algn="ctr"/>
-              <a:r>
-                <a:rPr lang="en-US" sz="6600" dirty="0">
-                  <a:ln w="0"/>
-                  <a:solidFill>
-                    <a:schemeClr val="tx1"/>
-                  </a:solidFill>
-                  <a:effectLst>
-                    <a:outerShdw blurRad="38100" dist="19050" dir="2700000" algn="tl" rotWithShape="0">
-                      <a:schemeClr val="dk1">
-                        <a:alpha val="40000"/>
-                      </a:schemeClr>
-                    </a:outerShdw>
-                  </a:effectLst>
-                </a:rPr>
-                <a:t>3</a:t>
-              </a:r>
-              <a:endParaRPr lang="en-US" sz="1600" dirty="0">
-                <a:ln w="0"/>
-                <a:solidFill>
-                  <a:schemeClr val="tx1"/>
-                </a:solidFill>
-                <a:effectLst>
-                  <a:outerShdw blurRad="38100" dist="19050" dir="2700000" algn="tl" rotWithShape="0">
-                    <a:schemeClr val="dk1">
-                      <a:alpha val="40000"/>
-                    </a:schemeClr>
-                  </a:outerShdw>
-                </a:effectLst>
-              </a:endParaRPr>
-            </a:p>
-          </p:txBody>
-        </p:sp>
-        <p:cxnSp>
-          <p:nvCxnSpPr>
-            <p:cNvPr id="28" name="Straight Connector 27"/>
-            <p:cNvCxnSpPr>
-              <a:stCxn id="27" idx="4"/>
-            </p:cNvCxnSpPr>
-            <p:nvPr/>
-          </p:nvCxnSpPr>
-          <p:spPr>
-            <a:xfrm>
-              <a:off x="7337461" y="960174"/>
-              <a:ext cx="9253" cy="552622"/>
-            </a:xfrm>
-            <a:prstGeom prst="line">
-              <a:avLst/>
-            </a:prstGeom>
-            <a:ln w="60325">
-              <a:solidFill>
-                <a:srgbClr val="05314B"/>
-              </a:solidFill>
-            </a:ln>
-          </p:spPr>
-          <p:style>
-            <a:lnRef idx="1">
-              <a:schemeClr val="accent1"/>
-            </a:lnRef>
-            <a:fillRef idx="0">
-              <a:schemeClr val="accent1"/>
-            </a:fillRef>
-            <a:effectRef idx="0">
-              <a:schemeClr val="accent1"/>
-            </a:effectRef>
-            <a:fontRef idx="minor">
-              <a:schemeClr val="tx1"/>
-            </a:fontRef>
-          </p:style>
-        </p:cxnSp>
-      </p:grpSp>
-      <p:grpSp>
-        <p:nvGrpSpPr>
-          <p:cNvPr id="29" name="Group 28"/>
-          <p:cNvGrpSpPr>
-            <a:grpSpLocks noChangeAspect="1"/>
-          </p:cNvGrpSpPr>
-          <p:nvPr/>
-        </p:nvGrpSpPr>
-        <p:grpSpPr>
-          <a:xfrm>
-            <a:off x="11566529" y="6627273"/>
-            <a:ext cx="1142051" cy="2396833"/>
-            <a:chOff x="7085974" y="457200"/>
-            <a:chExt cx="502973" cy="1055596"/>
-          </a:xfrm>
-        </p:grpSpPr>
-        <p:sp>
-          <p:nvSpPr>
-            <p:cNvPr id="30" name="Oval 29"/>
-            <p:cNvSpPr>
-              <a:spLocks/>
-            </p:cNvSpPr>
-            <p:nvPr/>
-          </p:nvSpPr>
-          <p:spPr>
-            <a:xfrm>
-              <a:off x="7085974" y="457200"/>
-              <a:ext cx="502973" cy="502974"/>
-            </a:xfrm>
-            <a:prstGeom prst="ellipse">
-              <a:avLst/>
-            </a:prstGeom>
-            <a:solidFill>
-              <a:srgbClr val="78EC75"/>
-            </a:solidFill>
-            <a:ln w="60325">
-              <a:solidFill>
-                <a:srgbClr val="05314B"/>
-              </a:solidFill>
-            </a:ln>
-          </p:spPr>
-          <p:style>
-            <a:lnRef idx="2">
-              <a:schemeClr val="accent1">
-                <a:shade val="50000"/>
-              </a:schemeClr>
-            </a:lnRef>
-            <a:fillRef idx="1">
-              <a:schemeClr val="accent1"/>
-            </a:fillRef>
-            <a:effectRef idx="0">
-              <a:schemeClr val="accent1"/>
-            </a:effectRef>
-            <a:fontRef idx="minor">
-              <a:schemeClr val="lt1"/>
-            </a:fontRef>
-          </p:style>
-          <p:txBody>
-            <a:bodyPr rtlCol="0" anchor="ctr"/>
-            <a:lstStyle/>
-            <a:p>
-              <a:pPr algn="ctr"/>
-              <a:r>
-                <a:rPr lang="en-US" sz="6600" dirty="0">
-                  <a:ln w="0"/>
-                  <a:solidFill>
-                    <a:schemeClr val="tx1"/>
-                  </a:solidFill>
-                  <a:effectLst>
-                    <a:outerShdw blurRad="38100" dist="19050" dir="2700000" algn="tl" rotWithShape="0">
-                      <a:schemeClr val="dk1">
-                        <a:alpha val="40000"/>
-                      </a:schemeClr>
-                    </a:outerShdw>
-                  </a:effectLst>
-                </a:rPr>
-                <a:t>2</a:t>
-              </a:r>
-              <a:endParaRPr lang="en-US" sz="1600" dirty="0">
-                <a:ln w="0"/>
-                <a:solidFill>
-                  <a:schemeClr val="tx1"/>
-                </a:solidFill>
-                <a:effectLst>
-                  <a:outerShdw blurRad="38100" dist="19050" dir="2700000" algn="tl" rotWithShape="0">
-                    <a:schemeClr val="dk1">
-                      <a:alpha val="40000"/>
-                    </a:schemeClr>
-                  </a:outerShdw>
-                </a:effectLst>
-              </a:endParaRPr>
-            </a:p>
-          </p:txBody>
-        </p:sp>
-        <p:cxnSp>
-          <p:nvCxnSpPr>
-            <p:cNvPr id="31" name="Straight Connector 30"/>
-            <p:cNvCxnSpPr>
-              <a:stCxn id="30" idx="4"/>
-            </p:cNvCxnSpPr>
-            <p:nvPr/>
-          </p:nvCxnSpPr>
-          <p:spPr>
-            <a:xfrm>
-              <a:off x="7337461" y="960174"/>
-              <a:ext cx="9253" cy="552622"/>
-            </a:xfrm>
-            <a:prstGeom prst="line">
-              <a:avLst/>
-            </a:prstGeom>
-            <a:ln w="60325">
-              <a:solidFill>
-                <a:srgbClr val="05314B"/>
-              </a:solidFill>
-            </a:ln>
-          </p:spPr>
-          <p:style>
-            <a:lnRef idx="1">
-              <a:schemeClr val="accent1"/>
-            </a:lnRef>
-            <a:fillRef idx="0">
-              <a:schemeClr val="accent1"/>
-            </a:fillRef>
-            <a:effectRef idx="0">
-              <a:schemeClr val="accent1"/>
-            </a:effectRef>
-            <a:fontRef idx="minor">
-              <a:schemeClr val="tx1"/>
-            </a:fontRef>
-          </p:style>
-        </p:cxnSp>
-      </p:grpSp>
-      <p:grpSp>
-        <p:nvGrpSpPr>
-          <p:cNvPr id="33" name="Group 32"/>
-          <p:cNvGrpSpPr>
-            <a:grpSpLocks noChangeAspect="1"/>
-          </p:cNvGrpSpPr>
-          <p:nvPr/>
-        </p:nvGrpSpPr>
-        <p:grpSpPr>
-          <a:xfrm>
-            <a:off x="14000636" y="5858021"/>
-            <a:ext cx="1142051" cy="2396833"/>
-            <a:chOff x="7085974" y="457200"/>
-            <a:chExt cx="502973" cy="1055596"/>
-          </a:xfrm>
-        </p:grpSpPr>
-        <p:sp>
-          <p:nvSpPr>
-            <p:cNvPr id="34" name="Oval 33"/>
-            <p:cNvSpPr>
-              <a:spLocks/>
-            </p:cNvSpPr>
-            <p:nvPr/>
-          </p:nvSpPr>
-          <p:spPr>
-            <a:xfrm>
-              <a:off x="7085974" y="457200"/>
-              <a:ext cx="502973" cy="502974"/>
-            </a:xfrm>
-            <a:prstGeom prst="ellipse">
-              <a:avLst/>
-            </a:prstGeom>
-            <a:solidFill>
-              <a:srgbClr val="61953C"/>
-            </a:solidFill>
-            <a:ln w="60325">
-              <a:solidFill>
-                <a:srgbClr val="05314B"/>
-              </a:solidFill>
-            </a:ln>
-          </p:spPr>
-          <p:style>
-            <a:lnRef idx="2">
-              <a:schemeClr val="accent1">
-                <a:shade val="50000"/>
-              </a:schemeClr>
-            </a:lnRef>
-            <a:fillRef idx="1">
-              <a:schemeClr val="accent1"/>
-            </a:fillRef>
-            <a:effectRef idx="0">
-              <a:schemeClr val="accent1"/>
-            </a:effectRef>
-            <a:fontRef idx="minor">
-              <a:schemeClr val="lt1"/>
-            </a:fontRef>
-          </p:style>
-          <p:txBody>
-            <a:bodyPr rtlCol="0" anchor="ctr"/>
-            <a:lstStyle/>
-            <a:p>
-              <a:pPr algn="ctr"/>
-              <a:r>
-                <a:rPr lang="en-US" sz="6600" dirty="0">
-                  <a:ln w="0"/>
-                  <a:solidFill>
-                    <a:schemeClr val="tx1"/>
-                  </a:solidFill>
-                  <a:effectLst>
-                    <a:outerShdw blurRad="38100" dist="19050" dir="2700000" algn="tl" rotWithShape="0">
-                      <a:schemeClr val="dk1">
-                        <a:alpha val="40000"/>
-                      </a:schemeClr>
-                    </a:outerShdw>
-                  </a:effectLst>
-                </a:rPr>
-                <a:t>6</a:t>
-              </a:r>
-              <a:endParaRPr lang="en-US" sz="1600" dirty="0">
-                <a:ln w="0"/>
-                <a:solidFill>
-                  <a:schemeClr val="tx1"/>
-                </a:solidFill>
-                <a:effectLst>
-                  <a:outerShdw blurRad="38100" dist="19050" dir="2700000" algn="tl" rotWithShape="0">
-                    <a:schemeClr val="dk1">
-                      <a:alpha val="40000"/>
-                    </a:schemeClr>
-                  </a:outerShdw>
-                </a:effectLst>
-              </a:endParaRPr>
-            </a:p>
-          </p:txBody>
-        </p:sp>
-        <p:cxnSp>
-          <p:nvCxnSpPr>
-            <p:cNvPr id="35" name="Straight Connector 34"/>
-            <p:cNvCxnSpPr>
-              <a:stCxn id="34" idx="4"/>
-            </p:cNvCxnSpPr>
-            <p:nvPr/>
-          </p:nvCxnSpPr>
-          <p:spPr>
-            <a:xfrm>
-              <a:off x="7337461" y="960174"/>
-              <a:ext cx="9253" cy="552622"/>
-            </a:xfrm>
-            <a:prstGeom prst="line">
-              <a:avLst/>
-            </a:prstGeom>
-            <a:ln w="60325">
-              <a:solidFill>
-                <a:srgbClr val="05314B"/>
-              </a:solidFill>
-            </a:ln>
-          </p:spPr>
-          <p:style>
-            <a:lnRef idx="1">
-              <a:schemeClr val="accent1"/>
-            </a:lnRef>
-            <a:fillRef idx="0">
-              <a:schemeClr val="accent1"/>
-            </a:fillRef>
-            <a:effectRef idx="0">
-              <a:schemeClr val="accent1"/>
-            </a:effectRef>
-            <a:fontRef idx="minor">
-              <a:schemeClr val="tx1"/>
-            </a:fontRef>
-          </p:style>
-        </p:cxnSp>
-      </p:grpSp>
-      <p:sp>
-        <p:nvSpPr>
-          <p:cNvPr id="36" name="Flowchart: Alternate Process 35"/>
-          <p:cNvSpPr/>
-          <p:nvPr/>
-        </p:nvSpPr>
-        <p:spPr>
-          <a:xfrm>
-            <a:off x="5875170" y="11608605"/>
-            <a:ext cx="8021905" cy="822960"/>
-          </a:xfrm>
-          <a:prstGeom prst="flowChartAlternateProcess">
-            <a:avLst/>
-          </a:prstGeom>
-          <a:solidFill>
-            <a:srgbClr val="E7E6E6"/>
-          </a:solidFill>
-          <a:ln>
-            <a:noFill/>
-          </a:ln>
-        </p:spPr>
-        <p:style>
-          <a:lnRef idx="2">
-            <a:schemeClr val="accent1">
-              <a:shade val="50000"/>
-            </a:schemeClr>
-          </a:lnRef>
-          <a:fillRef idx="1">
-            <a:schemeClr val="accent1"/>
-          </a:fillRef>
-          <a:effectRef idx="0">
-            <a:schemeClr val="accent1"/>
-          </a:effectRef>
-          <a:fontRef idx="minor">
-            <a:schemeClr val="lt1"/>
-          </a:fontRef>
-        </p:style>
-        <p:txBody>
-          <a:bodyPr rtlCol="0" anchor="ctr"/>
-          <a:lstStyle/>
-          <a:p>
-            <a:pPr algn="ctr"/>
-            <a:r>
-              <a:rPr lang="en-US" sz="4400" dirty="0" smtClean="0">
-                <a:solidFill>
-                  <a:srgbClr val="238B45"/>
-                </a:solidFill>
-              </a:rPr>
-              <a:t>Interaction between bundles</a:t>
-            </a:r>
-            <a:endParaRPr lang="en-US" sz="4400" dirty="0">
-              <a:solidFill>
-                <a:srgbClr val="238B45"/>
-              </a:solidFill>
-            </a:endParaRPr>
-          </a:p>
-        </p:txBody>
-      </p:sp>
-      <p:sp>
-        <p:nvSpPr>
-          <p:cNvPr id="37" name="Teardrop 36"/>
-          <p:cNvSpPr>
-            <a:spLocks noChangeAspect="1"/>
-          </p:cNvSpPr>
-          <p:nvPr/>
-        </p:nvSpPr>
-        <p:spPr>
-          <a:xfrm rot="5400000">
-            <a:off x="5298392" y="11294633"/>
-            <a:ext cx="1114016" cy="1159847"/>
-          </a:xfrm>
-          <a:prstGeom prst="teardrop">
-            <a:avLst/>
-          </a:prstGeom>
-          <a:solidFill>
-            <a:srgbClr val="238B45"/>
-          </a:solidFill>
-          <a:ln>
-            <a:solidFill>
-              <a:schemeClr val="accent1">
-                <a:shade val="50000"/>
-                <a:alpha val="19000"/>
-              </a:schemeClr>
-            </a:solidFill>
-          </a:ln>
-        </p:spPr>
-        <p:style>
-          <a:lnRef idx="2">
-            <a:schemeClr val="accent1">
-              <a:shade val="50000"/>
-            </a:schemeClr>
-          </a:lnRef>
-          <a:fillRef idx="1">
-            <a:schemeClr val="accent1"/>
-          </a:fillRef>
-          <a:effectRef idx="0">
-            <a:schemeClr val="accent1"/>
-          </a:effectRef>
-          <a:fontRef idx="minor">
-            <a:schemeClr val="lt1"/>
-          </a:fontRef>
-        </p:style>
-        <p:txBody>
-          <a:bodyPr vert="vert270" rtlCol="0" anchor="ctr"/>
-          <a:lstStyle/>
-          <a:p>
-            <a:pPr algn="ctr"/>
-            <a:r>
-              <a:rPr lang="en-US" sz="8800" dirty="0"/>
-              <a:t>C</a:t>
-            </a:r>
-            <a:endParaRPr lang="en-US" sz="8800" dirty="0"/>
-          </a:p>
-        </p:txBody>
-      </p:sp>
-    </p:spTree>
-    <p:extLst>
-      <p:ext uri="{BB962C8B-B14F-4D97-AF65-F5344CB8AC3E}">
-        <p14:creationId xmlns:p14="http://schemas.microsoft.com/office/powerpoint/2010/main" val="564388664"/>
-      </p:ext>
-    </p:extLst>
-  </p:cSld>
-  <p:clrMapOvr>
-    <a:masterClrMapping/>
-  </p:clrMapOvr>
-</p:sld>
-</file>
-
 <file path=ppt/theme/theme1.xml><?xml version="1.0" encoding="utf-8"?>
 <a:theme xmlns:a="http://schemas.openxmlformats.org/drawingml/2006/main" name="Office Theme">
   <a:themeElements>

</xml_diff>